<commit_message>
commited for pull request
</commit_message>
<xml_diff>
--- a/fifth_review.pptx
+++ b/fifth_review.pptx
@@ -5,18 +5,18 @@
     <p:sldMasterId id="2147483648" r:id="rId1"/>
   </p:sldMasterIdLst>
   <p:notesMasterIdLst>
-    <p:notesMasterId r:id="rId12"/>
+    <p:notesMasterId r:id="rId11"/>
   </p:notesMasterIdLst>
   <p:sldIdLst>
-    <p:sldId id="256" r:id="rId3"/>
-    <p:sldId id="257" r:id="rId4"/>
-    <p:sldId id="258" r:id="rId5"/>
-    <p:sldId id="259" r:id="rId6"/>
-    <p:sldId id="260" r:id="rId7"/>
-    <p:sldId id="261" r:id="rId8"/>
-    <p:sldId id="263" r:id="rId9"/>
-    <p:sldId id="264" r:id="rId10"/>
-    <p:sldId id="265" r:id="rId11"/>
+    <p:sldId id="256" r:id="rId2"/>
+    <p:sldId id="257" r:id="rId3"/>
+    <p:sldId id="258" r:id="rId4"/>
+    <p:sldId id="259" r:id="rId5"/>
+    <p:sldId id="260" r:id="rId6"/>
+    <p:sldId id="261" r:id="rId7"/>
+    <p:sldId id="263" r:id="rId8"/>
+    <p:sldId id="264" r:id="rId9"/>
+    <p:sldId id="265" r:id="rId10"/>
   </p:sldIdLst>
   <p:sldSz cx="9144000" cy="6858000" type="screen4x3"/>
   <p:notesSz cx="6858000" cy="9144000"/>
@@ -200,6 +200,8 @@
           <a:p>
             <a:fld id="{27B7BF55-4331-405B-BD3D-A916DA9DD4EF}" type="datetimeFigureOut">
               <a:rPr lang="en-US" smtClean="0"/>
+              <a:pPr/>
+              <a:t>2/21/2021</a:t>
             </a:fld>
             <a:endParaRPr lang="en-US"/>
           </a:p>
@@ -268,7 +270,6 @@
               <a:rPr lang="en-US" smtClean="0"/>
               <a:t>Click to edit Master text styles</a:t>
             </a:r>
-            <a:endParaRPr lang="en-US" smtClean="0"/>
           </a:p>
           <a:p>
             <a:pPr lvl="1"/>
@@ -276,7 +277,6 @@
               <a:rPr lang="en-US" smtClean="0"/>
               <a:t>Second level</a:t>
             </a:r>
-            <a:endParaRPr lang="en-US" smtClean="0"/>
           </a:p>
           <a:p>
             <a:pPr lvl="2"/>
@@ -284,7 +284,6 @@
               <a:rPr lang="en-US" smtClean="0"/>
               <a:t>Third level</a:t>
             </a:r>
-            <a:endParaRPr lang="en-US" smtClean="0"/>
           </a:p>
           <a:p>
             <a:pPr lvl="3"/>
@@ -292,7 +291,6 @@
               <a:rPr lang="en-US" smtClean="0"/>
               <a:t>Fourth level</a:t>
             </a:r>
-            <a:endParaRPr lang="en-US" smtClean="0"/>
           </a:p>
           <a:p>
             <a:pPr lvl="4"/>
@@ -364,6 +362,8 @@
           <a:p>
             <a:fld id="{53803850-3974-4A34-8498-CA9FB7558B04}" type="slidenum">
               <a:rPr lang="en-US" smtClean="0"/>
+              <a:pPr/>
+              <a:t>‹#›</a:t>
             </a:fld>
             <a:endParaRPr lang="en-US"/>
           </a:p>
@@ -648,6 +648,8 @@
           <a:p>
             <a:fld id="{4C484411-CE80-4393-BC22-731792D8F56D}" type="datetime1">
               <a:rPr lang="en-US" smtClean="0"/>
+              <a:pPr/>
+              <a:t>2/21/2021</a:t>
             </a:fld>
             <a:endParaRPr lang="en-US"/>
           </a:p>
@@ -693,6 +695,8 @@
           <a:p>
             <a:fld id="{B6F15528-21DE-4FAA-801E-634DDDAF4B2B}" type="slidenum">
               <a:rPr lang="en-US" smtClean="0"/>
+              <a:pPr/>
+              <a:t>‹#›</a:t>
             </a:fld>
             <a:endParaRPr lang="en-US"/>
           </a:p>
@@ -766,7 +770,6 @@
               <a:rPr lang="en-US" smtClean="0"/>
               <a:t>Click to edit Master text styles</a:t>
             </a:r>
-            <a:endParaRPr lang="en-US" smtClean="0"/>
           </a:p>
           <a:p>
             <a:pPr lvl="1"/>
@@ -774,7 +777,6 @@
               <a:rPr lang="en-US" smtClean="0"/>
               <a:t>Second level</a:t>
             </a:r>
-            <a:endParaRPr lang="en-US" smtClean="0"/>
           </a:p>
           <a:p>
             <a:pPr lvl="2"/>
@@ -782,7 +784,6 @@
               <a:rPr lang="en-US" smtClean="0"/>
               <a:t>Third level</a:t>
             </a:r>
-            <a:endParaRPr lang="en-US" smtClean="0"/>
           </a:p>
           <a:p>
             <a:pPr lvl="3"/>
@@ -790,7 +791,6 @@
               <a:rPr lang="en-US" smtClean="0"/>
               <a:t>Fourth level</a:t>
             </a:r>
-            <a:endParaRPr lang="en-US" smtClean="0"/>
           </a:p>
           <a:p>
             <a:pPr lvl="4"/>
@@ -819,6 +819,8 @@
           <a:p>
             <a:fld id="{1CA51FB7-0011-4112-B16C-C28BEE58E834}" type="datetime1">
               <a:rPr lang="en-US" smtClean="0"/>
+              <a:pPr/>
+              <a:t>2/21/2021</a:t>
             </a:fld>
             <a:endParaRPr lang="en-US"/>
           </a:p>
@@ -864,6 +866,8 @@
           <a:p>
             <a:fld id="{B6F15528-21DE-4FAA-801E-634DDDAF4B2B}" type="slidenum">
               <a:rPr lang="en-US" smtClean="0"/>
+              <a:pPr/>
+              <a:t>‹#›</a:t>
             </a:fld>
             <a:endParaRPr lang="en-US"/>
           </a:p>
@@ -947,7 +951,6 @@
               <a:rPr lang="en-US" smtClean="0"/>
               <a:t>Click to edit Master text styles</a:t>
             </a:r>
-            <a:endParaRPr lang="en-US" smtClean="0"/>
           </a:p>
           <a:p>
             <a:pPr lvl="1"/>
@@ -955,7 +958,6 @@
               <a:rPr lang="en-US" smtClean="0"/>
               <a:t>Second level</a:t>
             </a:r>
-            <a:endParaRPr lang="en-US" smtClean="0"/>
           </a:p>
           <a:p>
             <a:pPr lvl="2"/>
@@ -963,7 +965,6 @@
               <a:rPr lang="en-US" smtClean="0"/>
               <a:t>Third level</a:t>
             </a:r>
-            <a:endParaRPr lang="en-US" smtClean="0"/>
           </a:p>
           <a:p>
             <a:pPr lvl="3"/>
@@ -971,7 +972,6 @@
               <a:rPr lang="en-US" smtClean="0"/>
               <a:t>Fourth level</a:t>
             </a:r>
-            <a:endParaRPr lang="en-US" smtClean="0"/>
           </a:p>
           <a:p>
             <a:pPr lvl="4"/>
@@ -1000,6 +1000,8 @@
           <a:p>
             <a:fld id="{0D810325-AC91-463B-9DEC-6DFD76EF917E}" type="datetime1">
               <a:rPr lang="en-US" smtClean="0"/>
+              <a:pPr/>
+              <a:t>2/21/2021</a:t>
             </a:fld>
             <a:endParaRPr lang="en-US"/>
           </a:p>
@@ -1045,6 +1047,8 @@
           <a:p>
             <a:fld id="{B6F15528-21DE-4FAA-801E-634DDDAF4B2B}" type="slidenum">
               <a:rPr lang="en-US" smtClean="0"/>
+              <a:pPr/>
+              <a:t>‹#›</a:t>
             </a:fld>
             <a:endParaRPr lang="en-US"/>
           </a:p>
@@ -1118,7 +1122,6 @@
               <a:rPr lang="en-US" smtClean="0"/>
               <a:t>Click to edit Master text styles</a:t>
             </a:r>
-            <a:endParaRPr lang="en-US" smtClean="0"/>
           </a:p>
           <a:p>
             <a:pPr lvl="1"/>
@@ -1126,7 +1129,6 @@
               <a:rPr lang="en-US" smtClean="0"/>
               <a:t>Second level</a:t>
             </a:r>
-            <a:endParaRPr lang="en-US" smtClean="0"/>
           </a:p>
           <a:p>
             <a:pPr lvl="2"/>
@@ -1134,7 +1136,6 @@
               <a:rPr lang="en-US" smtClean="0"/>
               <a:t>Third level</a:t>
             </a:r>
-            <a:endParaRPr lang="en-US" smtClean="0"/>
           </a:p>
           <a:p>
             <a:pPr lvl="3"/>
@@ -1142,7 +1143,6 @@
               <a:rPr lang="en-US" smtClean="0"/>
               <a:t>Fourth level</a:t>
             </a:r>
-            <a:endParaRPr lang="en-US" smtClean="0"/>
           </a:p>
           <a:p>
             <a:pPr lvl="4"/>
@@ -1171,6 +1171,8 @@
           <a:p>
             <a:fld id="{29FF40B1-8B0E-4B72-970D-715561CA4C5D}" type="datetime1">
               <a:rPr lang="en-US" smtClean="0"/>
+              <a:pPr/>
+              <a:t>2/21/2021</a:t>
             </a:fld>
             <a:endParaRPr lang="en-US"/>
           </a:p>
@@ -1216,6 +1218,8 @@
           <a:p>
             <a:fld id="{B6F15528-21DE-4FAA-801E-634DDDAF4B2B}" type="slidenum">
               <a:rPr lang="en-US" smtClean="0"/>
+              <a:pPr/>
+              <a:t>‹#›</a:t>
             </a:fld>
             <a:endParaRPr lang="en-US"/>
           </a:p>
@@ -1394,7 +1398,6 @@
               <a:rPr lang="en-US" smtClean="0"/>
               <a:t>Click to edit Master text styles</a:t>
             </a:r>
-            <a:endParaRPr lang="en-US" smtClean="0"/>
           </a:p>
         </p:txBody>
       </p:sp>
@@ -1415,6 +1418,8 @@
           <a:p>
             <a:fld id="{C256BA5A-254D-4C01-A5C1-C9457C87A202}" type="datetime1">
               <a:rPr lang="en-US" smtClean="0"/>
+              <a:pPr/>
+              <a:t>2/21/2021</a:t>
             </a:fld>
             <a:endParaRPr lang="en-US"/>
           </a:p>
@@ -1460,6 +1465,8 @@
           <a:p>
             <a:fld id="{B6F15528-21DE-4FAA-801E-634DDDAF4B2B}" type="slidenum">
               <a:rPr lang="en-US" smtClean="0"/>
+              <a:pPr/>
+              <a:t>‹#›</a:t>
             </a:fld>
             <a:endParaRPr lang="en-US"/>
           </a:p>
@@ -1566,7 +1573,6 @@
               <a:rPr lang="en-US" smtClean="0"/>
               <a:t>Click to edit Master text styles</a:t>
             </a:r>
-            <a:endParaRPr lang="en-US" smtClean="0"/>
           </a:p>
           <a:p>
             <a:pPr lvl="1"/>
@@ -1574,7 +1580,6 @@
               <a:rPr lang="en-US" smtClean="0"/>
               <a:t>Second level</a:t>
             </a:r>
-            <a:endParaRPr lang="en-US" smtClean="0"/>
           </a:p>
           <a:p>
             <a:pPr lvl="2"/>
@@ -1582,7 +1587,6 @@
               <a:rPr lang="en-US" smtClean="0"/>
               <a:t>Third level</a:t>
             </a:r>
-            <a:endParaRPr lang="en-US" smtClean="0"/>
           </a:p>
           <a:p>
             <a:pPr lvl="3"/>
@@ -1590,7 +1594,6 @@
               <a:rPr lang="en-US" smtClean="0"/>
               <a:t>Fourth level</a:t>
             </a:r>
-            <a:endParaRPr lang="en-US" smtClean="0"/>
           </a:p>
           <a:p>
             <a:pPr lvl="4"/>
@@ -1655,7 +1658,6 @@
               <a:rPr lang="en-US" smtClean="0"/>
               <a:t>Click to edit Master text styles</a:t>
             </a:r>
-            <a:endParaRPr lang="en-US" smtClean="0"/>
           </a:p>
           <a:p>
             <a:pPr lvl="1"/>
@@ -1663,7 +1665,6 @@
               <a:rPr lang="en-US" smtClean="0"/>
               <a:t>Second level</a:t>
             </a:r>
-            <a:endParaRPr lang="en-US" smtClean="0"/>
           </a:p>
           <a:p>
             <a:pPr lvl="2"/>
@@ -1671,7 +1672,6 @@
               <a:rPr lang="en-US" smtClean="0"/>
               <a:t>Third level</a:t>
             </a:r>
-            <a:endParaRPr lang="en-US" smtClean="0"/>
           </a:p>
           <a:p>
             <a:pPr lvl="3"/>
@@ -1679,7 +1679,6 @@
               <a:rPr lang="en-US" smtClean="0"/>
               <a:t>Fourth level</a:t>
             </a:r>
-            <a:endParaRPr lang="en-US" smtClean="0"/>
           </a:p>
           <a:p>
             <a:pPr lvl="4"/>
@@ -1708,6 +1707,8 @@
           <a:p>
             <a:fld id="{11FC07AE-EECC-4B39-B2AC-B06E310F3617}" type="datetime1">
               <a:rPr lang="en-US" smtClean="0"/>
+              <a:pPr/>
+              <a:t>2/21/2021</a:t>
             </a:fld>
             <a:endParaRPr lang="en-US"/>
           </a:p>
@@ -1753,6 +1754,8 @@
           <a:p>
             <a:fld id="{B6F15528-21DE-4FAA-801E-634DDDAF4B2B}" type="slidenum">
               <a:rPr lang="en-US" smtClean="0"/>
+              <a:pPr/>
+              <a:t>‹#›</a:t>
             </a:fld>
             <a:endParaRPr lang="en-US"/>
           </a:p>
@@ -1872,7 +1875,6 @@
               <a:rPr lang="en-US" smtClean="0"/>
               <a:t>Click to edit Master text styles</a:t>
             </a:r>
-            <a:endParaRPr lang="en-US" smtClean="0"/>
           </a:p>
         </p:txBody>
       </p:sp>
@@ -1929,7 +1931,6 @@
               <a:rPr lang="en-US" smtClean="0"/>
               <a:t>Click to edit Master text styles</a:t>
             </a:r>
-            <a:endParaRPr lang="en-US" smtClean="0"/>
           </a:p>
           <a:p>
             <a:pPr lvl="1"/>
@@ -1937,7 +1938,6 @@
               <a:rPr lang="en-US" smtClean="0"/>
               <a:t>Second level</a:t>
             </a:r>
-            <a:endParaRPr lang="en-US" smtClean="0"/>
           </a:p>
           <a:p>
             <a:pPr lvl="2"/>
@@ -1945,7 +1945,6 @@
               <a:rPr lang="en-US" smtClean="0"/>
               <a:t>Third level</a:t>
             </a:r>
-            <a:endParaRPr lang="en-US" smtClean="0"/>
           </a:p>
           <a:p>
             <a:pPr lvl="3"/>
@@ -1953,7 +1952,6 @@
               <a:rPr lang="en-US" smtClean="0"/>
               <a:t>Fourth level</a:t>
             </a:r>
-            <a:endParaRPr lang="en-US" smtClean="0"/>
           </a:p>
           <a:p>
             <a:pPr lvl="4"/>
@@ -2027,7 +2025,6 @@
               <a:rPr lang="en-US" smtClean="0"/>
               <a:t>Click to edit Master text styles</a:t>
             </a:r>
-            <a:endParaRPr lang="en-US" smtClean="0"/>
           </a:p>
         </p:txBody>
       </p:sp>
@@ -2084,7 +2081,6 @@
               <a:rPr lang="en-US" smtClean="0"/>
               <a:t>Click to edit Master text styles</a:t>
             </a:r>
-            <a:endParaRPr lang="en-US" smtClean="0"/>
           </a:p>
           <a:p>
             <a:pPr lvl="1"/>
@@ -2092,7 +2088,6 @@
               <a:rPr lang="en-US" smtClean="0"/>
               <a:t>Second level</a:t>
             </a:r>
-            <a:endParaRPr lang="en-US" smtClean="0"/>
           </a:p>
           <a:p>
             <a:pPr lvl="2"/>
@@ -2100,7 +2095,6 @@
               <a:rPr lang="en-US" smtClean="0"/>
               <a:t>Third level</a:t>
             </a:r>
-            <a:endParaRPr lang="en-US" smtClean="0"/>
           </a:p>
           <a:p>
             <a:pPr lvl="3"/>
@@ -2108,7 +2102,6 @@
               <a:rPr lang="en-US" smtClean="0"/>
               <a:t>Fourth level</a:t>
             </a:r>
-            <a:endParaRPr lang="en-US" smtClean="0"/>
           </a:p>
           <a:p>
             <a:pPr lvl="4"/>
@@ -2137,6 +2130,8 @@
           <a:p>
             <a:fld id="{BB69D00F-91AD-43A6-9361-AB22366665FE}" type="datetime1">
               <a:rPr lang="en-US" smtClean="0"/>
+              <a:pPr/>
+              <a:t>2/21/2021</a:t>
             </a:fld>
             <a:endParaRPr lang="en-US"/>
           </a:p>
@@ -2182,6 +2177,8 @@
           <a:p>
             <a:fld id="{B6F15528-21DE-4FAA-801E-634DDDAF4B2B}" type="slidenum">
               <a:rPr lang="en-US" smtClean="0"/>
+              <a:pPr/>
+              <a:t>‹#›</a:t>
             </a:fld>
             <a:endParaRPr lang="en-US"/>
           </a:p>
@@ -2252,6 +2249,8 @@
           <a:p>
             <a:fld id="{56146552-625F-461E-A982-793A12B6DAF8}" type="datetime1">
               <a:rPr lang="en-US" smtClean="0"/>
+              <a:pPr/>
+              <a:t>2/21/2021</a:t>
             </a:fld>
             <a:endParaRPr lang="en-US"/>
           </a:p>
@@ -2297,6 +2296,8 @@
           <a:p>
             <a:fld id="{B6F15528-21DE-4FAA-801E-634DDDAF4B2B}" type="slidenum">
               <a:rPr lang="en-US" smtClean="0"/>
+              <a:pPr/>
+              <a:t>‹#›</a:t>
             </a:fld>
             <a:endParaRPr lang="en-US"/>
           </a:p>
@@ -2344,6 +2345,8 @@
           <a:p>
             <a:fld id="{08E4212E-F36A-40A9-859F-7B0EFF380630}" type="datetime1">
               <a:rPr lang="en-US" smtClean="0"/>
+              <a:pPr/>
+              <a:t>2/21/2021</a:t>
             </a:fld>
             <a:endParaRPr lang="en-US"/>
           </a:p>
@@ -2389,6 +2392,8 @@
           <a:p>
             <a:fld id="{B6F15528-21DE-4FAA-801E-634DDDAF4B2B}" type="slidenum">
               <a:rPr lang="en-US" smtClean="0"/>
+              <a:pPr/>
+              <a:t>‹#›</a:t>
             </a:fld>
             <a:endParaRPr lang="en-US"/>
           </a:p>
@@ -2504,7 +2509,6 @@
               <a:rPr lang="en-US" smtClean="0"/>
               <a:t>Click to edit Master text styles</a:t>
             </a:r>
-            <a:endParaRPr lang="en-US" smtClean="0"/>
           </a:p>
           <a:p>
             <a:pPr lvl="1"/>
@@ -2512,7 +2516,6 @@
               <a:rPr lang="en-US" smtClean="0"/>
               <a:t>Second level</a:t>
             </a:r>
-            <a:endParaRPr lang="en-US" smtClean="0"/>
           </a:p>
           <a:p>
             <a:pPr lvl="2"/>
@@ -2520,7 +2523,6 @@
               <a:rPr lang="en-US" smtClean="0"/>
               <a:t>Third level</a:t>
             </a:r>
-            <a:endParaRPr lang="en-US" smtClean="0"/>
           </a:p>
           <a:p>
             <a:pPr lvl="3"/>
@@ -2528,7 +2530,6 @@
               <a:rPr lang="en-US" smtClean="0"/>
               <a:t>Fourth level</a:t>
             </a:r>
-            <a:endParaRPr lang="en-US" smtClean="0"/>
           </a:p>
           <a:p>
             <a:pPr lvl="4"/>
@@ -2602,7 +2603,6 @@
               <a:rPr lang="en-US" smtClean="0"/>
               <a:t>Click to edit Master text styles</a:t>
             </a:r>
-            <a:endParaRPr lang="en-US" smtClean="0"/>
           </a:p>
         </p:txBody>
       </p:sp>
@@ -2623,6 +2623,8 @@
           <a:p>
             <a:fld id="{1256D674-32B0-4689-AB1B-636389CFCA04}" type="datetime1">
               <a:rPr lang="en-US" smtClean="0"/>
+              <a:pPr/>
+              <a:t>2/21/2021</a:t>
             </a:fld>
             <a:endParaRPr lang="en-US"/>
           </a:p>
@@ -2668,6 +2670,8 @@
           <a:p>
             <a:fld id="{B6F15528-21DE-4FAA-801E-634DDDAF4B2B}" type="slidenum">
               <a:rPr lang="en-US" smtClean="0"/>
+              <a:pPr/>
+              <a:t>‹#›</a:t>
             </a:fld>
             <a:endParaRPr lang="en-US"/>
           </a:p>
@@ -2853,7 +2857,6 @@
               <a:rPr lang="en-US" smtClean="0"/>
               <a:t>Click to edit Master text styles</a:t>
             </a:r>
-            <a:endParaRPr lang="en-US" smtClean="0"/>
           </a:p>
         </p:txBody>
       </p:sp>
@@ -2874,6 +2877,8 @@
           <a:p>
             <a:fld id="{4766EF3B-70A3-4B13-97EA-E44332BDF0AF}" type="datetime1">
               <a:rPr lang="en-US" smtClean="0"/>
+              <a:pPr/>
+              <a:t>2/21/2021</a:t>
             </a:fld>
             <a:endParaRPr lang="en-US"/>
           </a:p>
@@ -2919,6 +2924,8 @@
           <a:p>
             <a:fld id="{B6F15528-21DE-4FAA-801E-634DDDAF4B2B}" type="slidenum">
               <a:rPr lang="en-US" smtClean="0"/>
+              <a:pPr/>
+              <a:t>‹#›</a:t>
             </a:fld>
             <a:endParaRPr lang="en-US"/>
           </a:p>
@@ -3017,7 +3024,6 @@
               <a:rPr lang="en-US" smtClean="0"/>
               <a:t>Click to edit Master text styles</a:t>
             </a:r>
-            <a:endParaRPr lang="en-US" smtClean="0"/>
           </a:p>
           <a:p>
             <a:pPr lvl="1"/>
@@ -3025,7 +3031,6 @@
               <a:rPr lang="en-US" smtClean="0"/>
               <a:t>Second level</a:t>
             </a:r>
-            <a:endParaRPr lang="en-US" smtClean="0"/>
           </a:p>
           <a:p>
             <a:pPr lvl="2"/>
@@ -3033,7 +3038,6 @@
               <a:rPr lang="en-US" smtClean="0"/>
               <a:t>Third level</a:t>
             </a:r>
-            <a:endParaRPr lang="en-US" smtClean="0"/>
           </a:p>
           <a:p>
             <a:pPr lvl="3"/>
@@ -3041,7 +3045,6 @@
               <a:rPr lang="en-US" smtClean="0"/>
               <a:t>Fourth level</a:t>
             </a:r>
-            <a:endParaRPr lang="en-US" smtClean="0"/>
           </a:p>
           <a:p>
             <a:pPr lvl="4"/>
@@ -3088,6 +3091,8 @@
           <a:p>
             <a:fld id="{4E3BC41F-EA4F-43A4-B4D7-7693D03AF8C4}" type="datetime1">
               <a:rPr lang="en-US" smtClean="0"/>
+              <a:pPr/>
+              <a:t>2/21/2021</a:t>
             </a:fld>
             <a:endParaRPr lang="en-US"/>
           </a:p>
@@ -3169,6 +3174,8 @@
           <a:p>
             <a:fld id="{B6F15528-21DE-4FAA-801E-634DDDAF4B2B}" type="slidenum">
               <a:rPr lang="en-US" smtClean="0"/>
+              <a:pPr/>
+              <a:t>‹#›</a:t>
             </a:fld>
             <a:endParaRPr lang="en-US"/>
           </a:p>
@@ -3514,7 +3521,7 @@
           <p:nvPr/>
         </p:nvPicPr>
         <p:blipFill>
-          <a:blip r:embed="rId1"/>
+          <a:blip r:embed="rId2"/>
           <a:srcRect r="1445"/>
           <a:stretch>
             <a:fillRect/>
@@ -3548,6 +3555,8 @@
           <a:p>
             <a:fld id="{931F7737-6EA6-4FBE-AACE-8EEC38063CAC}" type="datetime1">
               <a:rPr lang="en-US" smtClean="0"/>
+              <a:pPr/>
+              <a:t>2/21/2021</a:t>
             </a:fld>
             <a:endParaRPr lang="en-US"/>
           </a:p>
@@ -3570,6 +3579,8 @@
           <a:p>
             <a:fld id="{B6F15528-21DE-4FAA-801E-634DDDAF4B2B}" type="slidenum">
               <a:rPr lang="en-US" smtClean="0"/>
+              <a:pPr/>
+              <a:t>1</a:t>
             </a:fld>
             <a:endParaRPr lang="en-US"/>
           </a:p>
@@ -3640,6 +3651,8 @@
           <a:p>
             <a:fld id="{29FF40B1-8B0E-4B72-970D-715561CA4C5D}" type="datetime1">
               <a:rPr lang="en-US" smtClean="0"/>
+              <a:pPr/>
+              <a:t>2/21/2021</a:t>
             </a:fld>
             <a:endParaRPr lang="en-US"/>
           </a:p>
@@ -3685,6 +3698,8 @@
           <a:p>
             <a:fld id="{B6F15528-21DE-4FAA-801E-634DDDAF4B2B}" type="slidenum">
               <a:rPr lang="en-US" smtClean="0"/>
+              <a:pPr/>
+              <a:t>2</a:t>
             </a:fld>
             <a:endParaRPr lang="en-US"/>
           </a:p>
@@ -3699,7 +3714,7 @@
           <p:nvPr/>
         </p:nvPicPr>
         <p:blipFill>
-          <a:blip r:embed="rId1"/>
+          <a:blip r:embed="rId2"/>
           <a:srcRect r="1445"/>
           <a:stretch>
             <a:fillRect/>
@@ -3750,15 +3765,6 @@
               </a:rPr>
               <a:t>Outlines</a:t>
             </a:r>
-            <a:endParaRPr lang="en-US" sz="2800" b="1" dirty="0" smtClean="0">
-              <a:solidFill>
-                <a:schemeClr val="tx2">
-                  <a:lumMod val="50000"/>
-                </a:schemeClr>
-              </a:solidFill>
-              <a:latin typeface="Times New Roman" panose="02020603050405020304" charset="0"/>
-              <a:cs typeface="Times New Roman" panose="02020603050405020304" charset="0"/>
-            </a:endParaRPr>
           </a:p>
           <a:p>
             <a:pPr marL="342900" indent="-342900">
@@ -3776,15 +3782,6 @@
               </a:rPr>
               <a:t>Background Information</a:t>
             </a:r>
-            <a:endParaRPr lang="en-US" sz="2800" b="1" dirty="0" smtClean="0">
-              <a:solidFill>
-                <a:schemeClr val="tx2">
-                  <a:lumMod val="50000"/>
-                </a:schemeClr>
-              </a:solidFill>
-              <a:latin typeface="Times New Roman" panose="02020603050405020304" charset="0"/>
-              <a:cs typeface="Times New Roman" panose="02020603050405020304" charset="0"/>
-            </a:endParaRPr>
           </a:p>
           <a:p>
             <a:pPr marL="342900" indent="-342900">
@@ -3802,15 +3799,6 @@
               </a:rPr>
               <a:t>Changes in Requirement</a:t>
             </a:r>
-            <a:endParaRPr lang="en-US" sz="2800" b="1" dirty="0" smtClean="0">
-              <a:solidFill>
-                <a:schemeClr val="tx2">
-                  <a:lumMod val="50000"/>
-                </a:schemeClr>
-              </a:solidFill>
-              <a:latin typeface="Times New Roman" panose="02020603050405020304" charset="0"/>
-              <a:cs typeface="Times New Roman" panose="02020603050405020304" charset="0"/>
-            </a:endParaRPr>
           </a:p>
           <a:p>
             <a:pPr marL="342900" indent="-342900">
@@ -3828,15 +3816,6 @@
               </a:rPr>
               <a:t>Product Scope</a:t>
             </a:r>
-            <a:endParaRPr lang="en-US" sz="2800" b="1" dirty="0" smtClean="0">
-              <a:solidFill>
-                <a:schemeClr val="tx2">
-                  <a:lumMod val="50000"/>
-                </a:schemeClr>
-              </a:solidFill>
-              <a:latin typeface="Times New Roman" panose="02020603050405020304" charset="0"/>
-              <a:cs typeface="Times New Roman" panose="02020603050405020304" charset="0"/>
-            </a:endParaRPr>
           </a:p>
           <a:p>
             <a:pPr marL="342900" indent="-342900">
@@ -3854,15 +3833,6 @@
               </a:rPr>
               <a:t>Site Map</a:t>
             </a:r>
-            <a:endParaRPr lang="en-US" sz="2800" b="1" dirty="0" smtClean="0">
-              <a:solidFill>
-                <a:schemeClr val="tx2">
-                  <a:lumMod val="50000"/>
-                </a:schemeClr>
-              </a:solidFill>
-              <a:latin typeface="Times New Roman" panose="02020603050405020304" charset="0"/>
-              <a:cs typeface="Times New Roman" panose="02020603050405020304" charset="0"/>
-            </a:endParaRPr>
           </a:p>
           <a:p>
             <a:pPr marL="342900" indent="-342900">
@@ -3880,15 +3850,6 @@
               </a:rPr>
               <a:t>UI Demo</a:t>
             </a:r>
-            <a:endParaRPr lang="en-US" sz="2800" b="1" dirty="0" smtClean="0">
-              <a:solidFill>
-                <a:schemeClr val="tx2">
-                  <a:lumMod val="50000"/>
-                </a:schemeClr>
-              </a:solidFill>
-              <a:latin typeface="Times New Roman" panose="02020603050405020304" charset="0"/>
-              <a:cs typeface="Times New Roman" panose="02020603050405020304" charset="0"/>
-            </a:endParaRPr>
           </a:p>
           <a:p>
             <a:pPr marL="342900" indent="-342900">
@@ -3906,15 +3867,6 @@
               </a:rPr>
               <a:t>Work progress</a:t>
             </a:r>
-            <a:endParaRPr lang="en-US" sz="2800" b="1" dirty="0" smtClean="0">
-              <a:solidFill>
-                <a:schemeClr val="tx2">
-                  <a:lumMod val="50000"/>
-                </a:schemeClr>
-              </a:solidFill>
-              <a:latin typeface="Times New Roman" panose="02020603050405020304" charset="0"/>
-              <a:cs typeface="Times New Roman" panose="02020603050405020304" charset="0"/>
-            </a:endParaRPr>
           </a:p>
           <a:p>
             <a:endParaRPr lang="en-US" sz="2800" b="1" dirty="0">
@@ -3946,7 +3898,14 @@
         <p:cNvGrpSpPr/>
         <p:nvPr/>
       </p:nvGrpSpPr>
-      <p:grpSpPr/>
+      <p:grpSpPr>
+        <a:xfrm>
+          <a:off x="0" y="0"/>
+          <a:ext cx="0" cy="0"/>
+          <a:chOff x="0" y="0"/>
+          <a:chExt cx="0" cy="0"/>
+        </a:xfrm>
+      </p:grpSpPr>
       <p:sp>
         <p:nvSpPr>
           <p:cNvPr id="2" name="Title 1"/>
@@ -3965,6 +3924,7 @@
         </p:spPr>
         <p:txBody>
           <a:bodyPr/>
+          <a:lstStyle/>
           <a:p>
             <a:pPr algn="l"/>
             <a:r>
@@ -3980,16 +3940,6 @@
               </a:rPr>
               <a:t>Background Information</a:t>
             </a:r>
-            <a:endParaRPr lang="en-US" sz="3200" b="1" dirty="0" smtClean="0">
-              <a:solidFill>
-                <a:schemeClr val="tx2">
-                  <a:lumMod val="50000"/>
-                </a:schemeClr>
-              </a:solidFill>
-              <a:latin typeface="Times New Roman" panose="02020603050405020304" charset="0"/>
-              <a:cs typeface="Times New Roman" panose="02020603050405020304" charset="0"/>
-              <a:sym typeface="+mn-ea"/>
-            </a:endParaRPr>
           </a:p>
         </p:txBody>
       </p:sp>
@@ -4011,6 +3961,7 @@
         </p:spPr>
         <p:txBody>
           <a:bodyPr/>
+          <a:lstStyle/>
           <a:p>
             <a:r>
               <a:rPr lang="en-US">
@@ -4019,10 +3970,6 @@
               </a:rPr>
               <a:t>Introduction</a:t>
             </a:r>
-            <a:endParaRPr lang="en-US">
-              <a:latin typeface="Times New Roman" panose="02020603050405020304" charset="0"/>
-              <a:cs typeface="Times New Roman" panose="02020603050405020304" charset="0"/>
-            </a:endParaRPr>
           </a:p>
           <a:p>
             <a:r>
@@ -4032,10 +3979,6 @@
               </a:rPr>
               <a:t>Purpose</a:t>
             </a:r>
-            <a:endParaRPr lang="en-US">
-              <a:latin typeface="Times New Roman" panose="02020603050405020304" charset="0"/>
-              <a:cs typeface="Times New Roman" panose="02020603050405020304" charset="0"/>
-            </a:endParaRPr>
           </a:p>
           <a:p>
             <a:r>
@@ -4045,10 +3988,6 @@
               </a:rPr>
               <a:t>Functionalities</a:t>
             </a:r>
-            <a:endParaRPr lang="en-US">
-              <a:latin typeface="Times New Roman" panose="02020603050405020304" charset="0"/>
-              <a:cs typeface="Times New Roman" panose="02020603050405020304" charset="0"/>
-            </a:endParaRPr>
           </a:p>
         </p:txBody>
       </p:sp>
@@ -4065,9 +4004,12 @@
         <p:spPr/>
         <p:txBody>
           <a:bodyPr/>
+          <a:lstStyle/>
           <a:p>
             <a:fld id="{29FF40B1-8B0E-4B72-970D-715561CA4C5D}" type="datetime1">
               <a:rPr lang="en-US" smtClean="0"/>
+              <a:pPr/>
+              <a:t>2/21/2021</a:t>
             </a:fld>
             <a:endParaRPr lang="en-US"/>
           </a:p>
@@ -4086,6 +4028,7 @@
         <p:spPr/>
         <p:txBody>
           <a:bodyPr/>
+          <a:lstStyle/>
           <a:p>
             <a:r>
               <a:rPr lang="en-US" smtClean="0"/>
@@ -4108,9 +4051,12 @@
         <p:spPr/>
         <p:txBody>
           <a:bodyPr/>
+          <a:lstStyle/>
           <a:p>
             <a:fld id="{B6F15528-21DE-4FAA-801E-634DDDAF4B2B}" type="slidenum">
               <a:rPr lang="en-US" smtClean="0"/>
+              <a:pPr/>
+              <a:t>3</a:t>
             </a:fld>
             <a:endParaRPr lang="en-US"/>
           </a:p>
@@ -4120,14 +4066,14 @@
         <p:nvPicPr>
           <p:cNvPr id="7" name="Picture 2" descr="GCIT"/>
           <p:cNvPicPr>
-            <a:picLocks noChangeAspect="1" noChangeArrowheads="1"/>
+            <a:picLocks noGrp="1" noChangeAspect="1" noChangeArrowheads="1"/>
           </p:cNvPicPr>
           <p:nvPr>
             <p:ph sz="half" idx="2"/>
           </p:nvPr>
         </p:nvPicPr>
         <p:blipFill>
-          <a:blip r:embed="rId1"/>
+          <a:blip r:embed="rId2"/>
           <a:srcRect r="1445"/>
           <a:stretch>
             <a:fillRect/>
@@ -4161,7 +4107,14 @@
         <p:cNvGrpSpPr/>
         <p:nvPr/>
       </p:nvGrpSpPr>
-      <p:grpSpPr/>
+      <p:grpSpPr>
+        <a:xfrm>
+          <a:off x="0" y="0"/>
+          <a:ext cx="0" cy="0"/>
+          <a:chOff x="0" y="0"/>
+          <a:chExt cx="0" cy="0"/>
+        </a:xfrm>
+      </p:grpSpPr>
       <p:sp>
         <p:nvSpPr>
           <p:cNvPr id="2" name="Title 1"/>
@@ -4180,6 +4133,7 @@
         </p:spPr>
         <p:txBody>
           <a:bodyPr/>
+          <a:lstStyle/>
           <a:p>
             <a:pPr algn="l"/>
             <a:r>
@@ -4195,16 +4149,6 @@
               </a:rPr>
               <a:t>Changes in Requirement</a:t>
             </a:r>
-            <a:endParaRPr lang="en-US" sz="3200" b="1" dirty="0" smtClean="0">
-              <a:solidFill>
-                <a:schemeClr val="tx2">
-                  <a:lumMod val="50000"/>
-                </a:schemeClr>
-              </a:solidFill>
-              <a:latin typeface="Times New Roman" panose="02020603050405020304" charset="0"/>
-              <a:cs typeface="Times New Roman" panose="02020603050405020304" charset="0"/>
-              <a:sym typeface="+mn-ea"/>
-            </a:endParaRPr>
           </a:p>
         </p:txBody>
       </p:sp>
@@ -4228,6 +4172,7 @@
           <a:bodyPr>
             <a:normAutofit/>
           </a:bodyPr>
+          <a:lstStyle/>
           <a:p>
             <a:r>
               <a:rPr lang="en-US" sz="2400">
@@ -4236,10 +4181,6 @@
               </a:rPr>
               <a:t>4.1 Student Registration</a:t>
             </a:r>
-            <a:endParaRPr lang="en-US" sz="2400">
-              <a:latin typeface="Times New Roman" panose="02020603050405020304" charset="0"/>
-              <a:cs typeface="Times New Roman" panose="02020603050405020304" charset="0"/>
-            </a:endParaRPr>
           </a:p>
           <a:p>
             <a:pPr lvl="1">
@@ -4253,10 +4194,6 @@
               </a:rPr>
               <a:t>Approval of students is done by class teacher</a:t>
             </a:r>
-            <a:endParaRPr lang="en-US" sz="2400">
-              <a:latin typeface="Times New Roman" panose="02020603050405020304" charset="0"/>
-              <a:cs typeface="Times New Roman" panose="02020603050405020304" charset="0"/>
-            </a:endParaRPr>
           </a:p>
           <a:p>
             <a:pPr marL="332740" lvl="1" indent="-285115">
@@ -4270,10 +4207,6 @@
               </a:rPr>
               <a:t> 4.2 Class Teacher Account Management </a:t>
             </a:r>
-            <a:endParaRPr lang="en-US" sz="2400">
-              <a:latin typeface="Times New Roman" panose="02020603050405020304" charset="0"/>
-              <a:cs typeface="Times New Roman" panose="02020603050405020304" charset="0"/>
-            </a:endParaRPr>
           </a:p>
           <a:p>
             <a:pPr marL="504825" lvl="1" indent="222250" defTabSz="914400">
@@ -4290,10 +4223,6 @@
               </a:rPr>
               <a:t> Edit action for admin</a:t>
             </a:r>
-            <a:endParaRPr lang="en-US" sz="2400">
-              <a:latin typeface="Times New Roman" panose="02020603050405020304" charset="0"/>
-              <a:cs typeface="Times New Roman" panose="02020603050405020304" charset="0"/>
-            </a:endParaRPr>
           </a:p>
           <a:p>
             <a:pPr marL="423545" lvl="1" indent="-379730" defTabSz="914400">
@@ -4310,10 +4239,6 @@
               </a:rPr>
               <a:t>4.3 Student Personal Detail Management	</a:t>
             </a:r>
-            <a:endParaRPr lang="en-US" sz="2400">
-              <a:latin typeface="Times New Roman" panose="02020603050405020304" charset="0"/>
-              <a:cs typeface="Times New Roman" panose="02020603050405020304" charset="0"/>
-            </a:endParaRPr>
           </a:p>
           <a:p>
             <a:pPr marL="500380" lvl="1" indent="-15875" defTabSz="914400">
@@ -4330,10 +4255,6 @@
               </a:rPr>
               <a:t>Edit action for admin</a:t>
             </a:r>
-            <a:endParaRPr lang="en-US" sz="2400">
-              <a:latin typeface="Times New Roman" panose="02020603050405020304" charset="0"/>
-              <a:cs typeface="Times New Roman" panose="02020603050405020304" charset="0"/>
-            </a:endParaRPr>
           </a:p>
           <a:p>
             <a:pPr marL="500380" lvl="1" indent="-15875" defTabSz="914400">
@@ -4350,10 +4271,6 @@
               </a:rPr>
               <a:t>Create action for student</a:t>
             </a:r>
-            <a:endParaRPr lang="en-US" sz="2400">
-              <a:latin typeface="Times New Roman" panose="02020603050405020304" charset="0"/>
-              <a:cs typeface="Times New Roman" panose="02020603050405020304" charset="0"/>
-            </a:endParaRPr>
           </a:p>
         </p:txBody>
       </p:sp>
@@ -4370,9 +4287,12 @@
         <p:spPr/>
         <p:txBody>
           <a:bodyPr/>
+          <a:lstStyle/>
           <a:p>
             <a:fld id="{29FF40B1-8B0E-4B72-970D-715561CA4C5D}" type="datetime1">
               <a:rPr lang="en-US" smtClean="0"/>
+              <a:pPr/>
+              <a:t>2/21/2021</a:t>
             </a:fld>
             <a:endParaRPr lang="en-US"/>
           </a:p>
@@ -4391,6 +4311,7 @@
         <p:spPr/>
         <p:txBody>
           <a:bodyPr/>
+          <a:lstStyle/>
           <a:p>
             <a:r>
               <a:rPr lang="en-US" smtClean="0"/>
@@ -4413,9 +4334,12 @@
         <p:spPr/>
         <p:txBody>
           <a:bodyPr/>
+          <a:lstStyle/>
           <a:p>
             <a:fld id="{B6F15528-21DE-4FAA-801E-634DDDAF4B2B}" type="slidenum">
               <a:rPr lang="en-US" smtClean="0"/>
+              <a:pPr/>
+              <a:t>4</a:t>
             </a:fld>
             <a:endParaRPr lang="en-US"/>
           </a:p>
@@ -4425,14 +4349,14 @@
         <p:nvPicPr>
           <p:cNvPr id="7" name="Picture 2" descr="GCIT"/>
           <p:cNvPicPr>
-            <a:picLocks noChangeAspect="1" noChangeArrowheads="1"/>
+            <a:picLocks noGrp="1" noChangeAspect="1" noChangeArrowheads="1"/>
           </p:cNvPicPr>
           <p:nvPr>
             <p:ph sz="half" idx="2"/>
           </p:nvPr>
         </p:nvPicPr>
         <p:blipFill>
-          <a:blip r:embed="rId1"/>
+          <a:blip r:embed="rId2"/>
           <a:srcRect r="1445"/>
           <a:stretch>
             <a:fillRect/>
@@ -4466,7 +4390,14 @@
         <p:cNvGrpSpPr/>
         <p:nvPr/>
       </p:nvGrpSpPr>
-      <p:grpSpPr/>
+      <p:grpSpPr>
+        <a:xfrm>
+          <a:off x="0" y="0"/>
+          <a:ext cx="0" cy="0"/>
+          <a:chOff x="0" y="0"/>
+          <a:chExt cx="0" cy="0"/>
+        </a:xfrm>
+      </p:grpSpPr>
       <p:sp>
         <p:nvSpPr>
           <p:cNvPr id="2" name="Title 1"/>
@@ -4487,6 +4418,7 @@
           <a:bodyPr>
             <a:normAutofit fontScale="90000"/>
           </a:bodyPr>
+          <a:lstStyle/>
           <a:p>
             <a:pPr algn="l"/>
             <a:r>
@@ -4502,16 +4434,6 @@
               </a:rPr>
               <a:t>Product Scope</a:t>
             </a:r>
-            <a:endParaRPr lang="en-US" sz="3600" b="1" dirty="0" smtClean="0">
-              <a:solidFill>
-                <a:schemeClr val="tx2">
-                  <a:lumMod val="50000"/>
-                </a:schemeClr>
-              </a:solidFill>
-              <a:latin typeface="Times New Roman" panose="02020603050405020304" charset="0"/>
-              <a:cs typeface="Times New Roman" panose="02020603050405020304" charset="0"/>
-              <a:sym typeface="+mn-ea"/>
-            </a:endParaRPr>
           </a:p>
         </p:txBody>
       </p:sp>
@@ -4533,31 +4455,55 @@
         </p:spPr>
         <p:txBody>
           <a:bodyPr/>
-          <a:p>
-            <a:r>
-              <a:rPr lang="en-US" sz="2800">
+          <a:lstStyle/>
+          <a:p>
+            <a:r>
+              <a:rPr lang="en-US" sz="2800" dirty="0" smtClean="0">
                 <a:latin typeface="Times New Roman" panose="02020603050405020304" charset="0"/>
                 <a:cs typeface="Times New Roman" panose="02020603050405020304" charset="0"/>
               </a:rPr>
-              <a:t>Introducing digitized student registration system </a:t>
-            </a:r>
-            <a:endParaRPr lang="en-US" sz="2800">
-              <a:latin typeface="Times New Roman" panose="02020603050405020304" charset="0"/>
-              <a:cs typeface="Times New Roman" panose="02020603050405020304" charset="0"/>
-            </a:endParaRPr>
-          </a:p>
-          <a:p>
-            <a:r>
-              <a:rPr lang="en-US" sz="2800">
+              <a:t>The end product should be able to manage student detail such as :-</a:t>
+            </a:r>
+          </a:p>
+          <a:p>
+            <a:pPr lvl="1"/>
+            <a:r>
+              <a:rPr lang="en-US" sz="2400" dirty="0" smtClean="0">
                 <a:latin typeface="Times New Roman" panose="02020603050405020304" charset="0"/>
                 <a:cs typeface="Times New Roman" panose="02020603050405020304" charset="0"/>
               </a:rPr>
-              <a:t>Replacing paper-based student information management system </a:t>
-            </a:r>
-            <a:endParaRPr lang="en-US" sz="2800">
-              <a:latin typeface="Times New Roman" panose="02020603050405020304" charset="0"/>
-              <a:cs typeface="Times New Roman" panose="02020603050405020304" charset="0"/>
-            </a:endParaRPr>
+              <a:t>Attendance</a:t>
+            </a:r>
+          </a:p>
+          <a:p>
+            <a:pPr lvl="1"/>
+            <a:r>
+              <a:rPr lang="en-US" sz="2400" dirty="0" smtClean="0">
+                <a:latin typeface="Times New Roman" panose="02020603050405020304" charset="0"/>
+                <a:cs typeface="Times New Roman" panose="02020603050405020304" charset="0"/>
+              </a:rPr>
+              <a:t>Statement</a:t>
+            </a:r>
+          </a:p>
+          <a:p>
+            <a:pPr lvl="1"/>
+            <a:r>
+              <a:rPr lang="en-US" sz="2400" dirty="0" smtClean="0">
+                <a:latin typeface="Times New Roman" panose="02020603050405020304" charset="0"/>
+                <a:cs typeface="Times New Roman" panose="02020603050405020304" charset="0"/>
+              </a:rPr>
+              <a:t>Result</a:t>
+            </a:r>
+          </a:p>
+          <a:p>
+            <a:pPr lvl="1"/>
+            <a:r>
+              <a:rPr lang="en-US" sz="2400" dirty="0" smtClean="0">
+                <a:latin typeface="Times New Roman" panose="02020603050405020304" charset="0"/>
+                <a:cs typeface="Times New Roman" panose="02020603050405020304" charset="0"/>
+              </a:rPr>
+              <a:t>Bio data</a:t>
+            </a:r>
           </a:p>
         </p:txBody>
       </p:sp>
@@ -4574,9 +4520,12 @@
         <p:spPr/>
         <p:txBody>
           <a:bodyPr/>
+          <a:lstStyle/>
           <a:p>
             <a:fld id="{29FF40B1-8B0E-4B72-970D-715561CA4C5D}" type="datetime1">
               <a:rPr lang="en-US" smtClean="0"/>
+              <a:pPr/>
+              <a:t>2/21/2021</a:t>
             </a:fld>
             <a:endParaRPr lang="en-US"/>
           </a:p>
@@ -4595,6 +4544,7 @@
         <p:spPr/>
         <p:txBody>
           <a:bodyPr/>
+          <a:lstStyle/>
           <a:p>
             <a:r>
               <a:rPr lang="en-US" smtClean="0"/>
@@ -4617,9 +4567,12 @@
         <p:spPr/>
         <p:txBody>
           <a:bodyPr/>
+          <a:lstStyle/>
           <a:p>
             <a:fld id="{B6F15528-21DE-4FAA-801E-634DDDAF4B2B}" type="slidenum">
               <a:rPr lang="en-US" smtClean="0"/>
+              <a:pPr/>
+              <a:t>5</a:t>
             </a:fld>
             <a:endParaRPr lang="en-US"/>
           </a:p>
@@ -4629,14 +4582,14 @@
         <p:nvPicPr>
           <p:cNvPr id="7" name="Picture 2" descr="GCIT"/>
           <p:cNvPicPr>
-            <a:picLocks noChangeAspect="1" noChangeArrowheads="1"/>
+            <a:picLocks noGrp="1" noChangeAspect="1" noChangeArrowheads="1"/>
           </p:cNvPicPr>
           <p:nvPr>
             <p:ph sz="half" idx="2"/>
           </p:nvPr>
         </p:nvPicPr>
         <p:blipFill>
-          <a:blip r:embed="rId1"/>
+          <a:blip r:embed="rId2"/>
           <a:srcRect r="1445"/>
           <a:stretch>
             <a:fillRect/>
@@ -4670,7 +4623,14 @@
         <p:cNvGrpSpPr/>
         <p:nvPr/>
       </p:nvGrpSpPr>
-      <p:grpSpPr/>
+      <p:grpSpPr>
+        <a:xfrm>
+          <a:off x="0" y="0"/>
+          <a:ext cx="0" cy="0"/>
+          <a:chOff x="0" y="0"/>
+          <a:chExt cx="0" cy="0"/>
+        </a:xfrm>
+      </p:grpSpPr>
       <p:sp>
         <p:nvSpPr>
           <p:cNvPr id="2" name="Title 1"/>
@@ -4689,6 +4649,7 @@
         </p:spPr>
         <p:txBody>
           <a:bodyPr/>
+          <a:lstStyle/>
           <a:p>
             <a:pPr algn="l"/>
             <a:r>
@@ -4698,10 +4659,6 @@
               </a:rPr>
               <a:t>Site Map</a:t>
             </a:r>
-            <a:endParaRPr lang="en-US" sz="3200" b="1">
-              <a:latin typeface="Times New Roman" panose="02020603050405020304" charset="0"/>
-              <a:cs typeface="Times New Roman" panose="02020603050405020304" charset="0"/>
-            </a:endParaRPr>
           </a:p>
         </p:txBody>
       </p:sp>
@@ -4723,6 +4680,7 @@
         </p:spPr>
         <p:txBody>
           <a:bodyPr/>
+          <a:lstStyle/>
           <a:p>
             <a:endParaRPr lang="en-US">
               <a:latin typeface="Times New Roman" panose="02020603050405020304" charset="0"/>
@@ -4744,9 +4702,12 @@
         <p:spPr/>
         <p:txBody>
           <a:bodyPr/>
+          <a:lstStyle/>
           <a:p>
             <a:fld id="{29FF40B1-8B0E-4B72-970D-715561CA4C5D}" type="datetime1">
               <a:rPr lang="en-US" smtClean="0"/>
+              <a:pPr/>
+              <a:t>2/21/2021</a:t>
             </a:fld>
             <a:endParaRPr lang="en-US"/>
           </a:p>
@@ -4765,6 +4726,7 @@
         <p:spPr/>
         <p:txBody>
           <a:bodyPr/>
+          <a:lstStyle/>
           <a:p>
             <a:r>
               <a:rPr lang="en-US" smtClean="0"/>
@@ -4787,9 +4749,12 @@
         <p:spPr/>
         <p:txBody>
           <a:bodyPr/>
+          <a:lstStyle/>
           <a:p>
             <a:fld id="{B6F15528-21DE-4FAA-801E-634DDDAF4B2B}" type="slidenum">
               <a:rPr lang="en-US" smtClean="0"/>
+              <a:pPr/>
+              <a:t>6</a:t>
             </a:fld>
             <a:endParaRPr lang="en-US"/>
           </a:p>
@@ -4799,14 +4764,14 @@
         <p:nvPicPr>
           <p:cNvPr id="7" name="Picture 2" descr="GCIT"/>
           <p:cNvPicPr>
-            <a:picLocks noChangeAspect="1" noChangeArrowheads="1"/>
+            <a:picLocks noGrp="1" noChangeAspect="1" noChangeArrowheads="1"/>
           </p:cNvPicPr>
           <p:nvPr>
             <p:ph sz="half" idx="2"/>
           </p:nvPr>
         </p:nvPicPr>
         <p:blipFill>
-          <a:blip r:embed="rId1"/>
+          <a:blip r:embed="rId2"/>
           <a:srcRect r="1445"/>
           <a:stretch>
             <a:fillRect/>
@@ -4840,7 +4805,14 @@
         <p:cNvGrpSpPr/>
         <p:nvPr/>
       </p:nvGrpSpPr>
-      <p:grpSpPr/>
+      <p:grpSpPr>
+        <a:xfrm>
+          <a:off x="0" y="0"/>
+          <a:ext cx="0" cy="0"/>
+          <a:chOff x="0" y="0"/>
+          <a:chExt cx="0" cy="0"/>
+        </a:xfrm>
+      </p:grpSpPr>
       <p:sp>
         <p:nvSpPr>
           <p:cNvPr id="2" name="Title 1"/>
@@ -4859,6 +4831,7 @@
         </p:spPr>
         <p:txBody>
           <a:bodyPr/>
+          <a:lstStyle/>
           <a:p>
             <a:pPr algn="l"/>
             <a:r>
@@ -4874,16 +4847,6 @@
               </a:rPr>
               <a:t>UI Demo</a:t>
             </a:r>
-            <a:endParaRPr lang="en-US" sz="3200" b="1" dirty="0" smtClean="0">
-              <a:solidFill>
-                <a:schemeClr val="tx2">
-                  <a:lumMod val="50000"/>
-                </a:schemeClr>
-              </a:solidFill>
-              <a:latin typeface="Times New Roman" panose="02020603050405020304" charset="0"/>
-              <a:cs typeface="Times New Roman" panose="02020603050405020304" charset="0"/>
-              <a:sym typeface="+mn-ea"/>
-            </a:endParaRPr>
           </a:p>
         </p:txBody>
       </p:sp>
@@ -4905,6 +4868,7 @@
         </p:spPr>
         <p:txBody>
           <a:bodyPr/>
+          <a:lstStyle/>
           <a:p>
             <a:endParaRPr lang="en-US">
               <a:latin typeface="Times New Roman" panose="02020603050405020304" charset="0"/>
@@ -4926,9 +4890,12 @@
         <p:spPr/>
         <p:txBody>
           <a:bodyPr/>
+          <a:lstStyle/>
           <a:p>
             <a:fld id="{29FF40B1-8B0E-4B72-970D-715561CA4C5D}" type="datetime1">
               <a:rPr lang="en-US" smtClean="0"/>
+              <a:pPr/>
+              <a:t>2/21/2021</a:t>
             </a:fld>
             <a:endParaRPr lang="en-US"/>
           </a:p>
@@ -4947,6 +4914,7 @@
         <p:spPr/>
         <p:txBody>
           <a:bodyPr/>
+          <a:lstStyle/>
           <a:p>
             <a:r>
               <a:rPr lang="en-US" smtClean="0"/>
@@ -4969,9 +4937,12 @@
         <p:spPr/>
         <p:txBody>
           <a:bodyPr/>
+          <a:lstStyle/>
           <a:p>
             <a:fld id="{B6F15528-21DE-4FAA-801E-634DDDAF4B2B}" type="slidenum">
               <a:rPr lang="en-US" smtClean="0"/>
+              <a:pPr/>
+              <a:t>7</a:t>
             </a:fld>
             <a:endParaRPr lang="en-US"/>
           </a:p>
@@ -4981,14 +4952,14 @@
         <p:nvPicPr>
           <p:cNvPr id="7" name="Picture 2" descr="GCIT"/>
           <p:cNvPicPr>
-            <a:picLocks noChangeAspect="1" noChangeArrowheads="1"/>
+            <a:picLocks noGrp="1" noChangeAspect="1" noChangeArrowheads="1"/>
           </p:cNvPicPr>
           <p:nvPr>
             <p:ph sz="half" idx="2"/>
           </p:nvPr>
         </p:nvPicPr>
         <p:blipFill>
-          <a:blip r:embed="rId1"/>
+          <a:blip r:embed="rId2"/>
           <a:srcRect r="1445"/>
           <a:stretch>
             <a:fillRect/>
@@ -5022,7 +4993,14 @@
         <p:cNvGrpSpPr/>
         <p:nvPr/>
       </p:nvGrpSpPr>
-      <p:grpSpPr/>
+      <p:grpSpPr>
+        <a:xfrm>
+          <a:off x="0" y="0"/>
+          <a:ext cx="0" cy="0"/>
+          <a:chOff x="0" y="0"/>
+          <a:chExt cx="0" cy="0"/>
+        </a:xfrm>
+      </p:grpSpPr>
       <p:sp>
         <p:nvSpPr>
           <p:cNvPr id="2" name="Title 1"/>
@@ -5043,6 +5021,7 @@
           <a:bodyPr>
             <a:noAutofit/>
           </a:bodyPr>
+          <a:lstStyle/>
           <a:p>
             <a:pPr algn="l"/>
             <a:r>
@@ -5058,16 +5037,6 @@
               </a:rPr>
               <a:t>Work progress</a:t>
             </a:r>
-            <a:endParaRPr lang="en-US" sz="3200" b="1" dirty="0" smtClean="0">
-              <a:solidFill>
-                <a:schemeClr val="tx2">
-                  <a:lumMod val="50000"/>
-                </a:schemeClr>
-              </a:solidFill>
-              <a:latin typeface="Times New Roman" panose="02020603050405020304" charset="0"/>
-              <a:cs typeface="Times New Roman" panose="02020603050405020304" charset="0"/>
-              <a:sym typeface="+mn-ea"/>
-            </a:endParaRPr>
           </a:p>
         </p:txBody>
       </p:sp>
@@ -5088,58 +5057,91 @@
           </a:xfrm>
         </p:spPr>
         <p:txBody>
-          <a:bodyPr/>
-          <a:p>
-            <a:r>
-              <a:rPr lang="en-US">
+          <a:bodyPr>
+            <a:normAutofit/>
+          </a:bodyPr>
+          <a:lstStyle/>
+          <a:p>
+            <a:r>
+              <a:rPr lang="en-US" sz="2400" dirty="0">
                 <a:latin typeface="Times New Roman" panose="02020603050405020304" charset="0"/>
                 <a:cs typeface="Times New Roman" panose="02020603050405020304" charset="0"/>
               </a:rPr>
               <a:t>Frontend </a:t>
             </a:r>
-            <a:endParaRPr lang="en-US">
+          </a:p>
+          <a:p>
+            <a:pPr marL="0" indent="0">
+              <a:buNone/>
+            </a:pPr>
+            <a:r>
+              <a:rPr lang="en-US" sz="2400" b="1" dirty="0">
+                <a:latin typeface="Times New Roman" panose="02020603050405020304" charset="0"/>
+                <a:cs typeface="Times New Roman" panose="02020603050405020304" charset="0"/>
+              </a:rPr>
+              <a:t>Future </a:t>
+            </a:r>
+            <a:r>
+              <a:rPr lang="en-US" sz="2400" b="1" dirty="0" smtClean="0">
+                <a:latin typeface="Times New Roman" panose="02020603050405020304" charset="0"/>
+                <a:cs typeface="Times New Roman" panose="02020603050405020304" charset="0"/>
+              </a:rPr>
+              <a:t>work</a:t>
+            </a:r>
+          </a:p>
+          <a:p>
+            <a:r>
+              <a:rPr lang="en-US" sz="2400" dirty="0" smtClean="0">
+                <a:latin typeface="Times New Roman" panose="02020603050405020304" charset="0"/>
+                <a:cs typeface="Times New Roman" panose="02020603050405020304" charset="0"/>
+              </a:rPr>
+              <a:t>Creating Migration and Models,</a:t>
+            </a:r>
+          </a:p>
+          <a:p>
+            <a:r>
+              <a:rPr lang="en-US" sz="2400" dirty="0" smtClean="0">
+                <a:latin typeface="Times New Roman" panose="02020603050405020304" charset="0"/>
+                <a:cs typeface="Times New Roman" panose="02020603050405020304" charset="0"/>
+              </a:rPr>
+              <a:t>Seeding database,</a:t>
+            </a:r>
+          </a:p>
+          <a:p>
+            <a:r>
+              <a:rPr lang="en-US" sz="2400" dirty="0" smtClean="0">
+                <a:latin typeface="Times New Roman" panose="02020603050405020304" charset="0"/>
+                <a:cs typeface="Times New Roman" panose="02020603050405020304" charset="0"/>
+              </a:rPr>
+              <a:t>Generating resource controllers,</a:t>
+            </a:r>
+            <a:endParaRPr lang="en-US" sz="2400" dirty="0" smtClean="0">
               <a:latin typeface="Times New Roman" panose="02020603050405020304" charset="0"/>
               <a:cs typeface="Times New Roman" panose="02020603050405020304" charset="0"/>
             </a:endParaRPr>
           </a:p>
           <a:p>
-            <a:pPr marL="0" indent="0">
-              <a:buNone/>
-            </a:pPr>
-            <a:r>
-              <a:rPr lang="en-US" b="1">
+            <a:r>
+              <a:rPr lang="en-US" sz="2400" dirty="0" smtClean="0">
                 <a:latin typeface="Times New Roman" panose="02020603050405020304" charset="0"/>
                 <a:cs typeface="Times New Roman" panose="02020603050405020304" charset="0"/>
               </a:rPr>
-              <a:t>Future work</a:t>
-            </a:r>
-            <a:endParaRPr lang="en-US" b="1">
+              <a:t>Gates and policy,</a:t>
+            </a:r>
+            <a:endParaRPr lang="en-US" sz="2400" dirty="0" smtClean="0">
               <a:latin typeface="Times New Roman" panose="02020603050405020304" charset="0"/>
               <a:cs typeface="Times New Roman" panose="02020603050405020304" charset="0"/>
             </a:endParaRPr>
           </a:p>
           <a:p>
-            <a:r>
-              <a:rPr lang="en-US">
-                <a:latin typeface="Times New Roman" panose="02020603050405020304" charset="0"/>
-                <a:cs typeface="Times New Roman" panose="02020603050405020304" charset="0"/>
-              </a:rPr>
-              <a:t>Backend using Laravel framework</a:t>
-            </a:r>
-            <a:endParaRPr lang="en-US">
+            <a:pPr marL="0" indent="0">
+              <a:buNone/>
+            </a:pPr>
+            <a:endParaRPr lang="en-US" sz="2400" dirty="0">
               <a:latin typeface="Times New Roman" panose="02020603050405020304" charset="0"/>
               <a:cs typeface="Times New Roman" panose="02020603050405020304" charset="0"/>
             </a:endParaRPr>
           </a:p>
-          <a:p>
-            <a:pPr marL="0" indent="0">
-              <a:buNone/>
-            </a:pPr>
-            <a:endParaRPr lang="en-US">
-              <a:latin typeface="Times New Roman" panose="02020603050405020304" charset="0"/>
-              <a:cs typeface="Times New Roman" panose="02020603050405020304" charset="0"/>
-            </a:endParaRPr>
-          </a:p>
         </p:txBody>
       </p:sp>
       <p:sp>
@@ -5155,9 +5157,12 @@
         <p:spPr/>
         <p:txBody>
           <a:bodyPr/>
+          <a:lstStyle/>
           <a:p>
             <a:fld id="{29FF40B1-8B0E-4B72-970D-715561CA4C5D}" type="datetime1">
               <a:rPr lang="en-US" smtClean="0"/>
+              <a:pPr/>
+              <a:t>2/21/2021</a:t>
             </a:fld>
             <a:endParaRPr lang="en-US"/>
           </a:p>
@@ -5176,6 +5181,7 @@
         <p:spPr/>
         <p:txBody>
           <a:bodyPr/>
+          <a:lstStyle/>
           <a:p>
             <a:r>
               <a:rPr lang="en-US" smtClean="0"/>
@@ -5198,9 +5204,12 @@
         <p:spPr/>
         <p:txBody>
           <a:bodyPr/>
+          <a:lstStyle/>
           <a:p>
             <a:fld id="{B6F15528-21DE-4FAA-801E-634DDDAF4B2B}" type="slidenum">
               <a:rPr lang="en-US" smtClean="0"/>
+              <a:pPr/>
+              <a:t>8</a:t>
             </a:fld>
             <a:endParaRPr lang="en-US"/>
           </a:p>
@@ -5210,14 +5219,14 @@
         <p:nvPicPr>
           <p:cNvPr id="7" name="Picture 2" descr="GCIT"/>
           <p:cNvPicPr>
-            <a:picLocks noChangeAspect="1" noChangeArrowheads="1"/>
+            <a:picLocks noGrp="1" noChangeAspect="1" noChangeArrowheads="1"/>
           </p:cNvPicPr>
           <p:nvPr>
             <p:ph sz="half" idx="2"/>
           </p:nvPr>
         </p:nvPicPr>
         <p:blipFill>
-          <a:blip r:embed="rId1"/>
+          <a:blip r:embed="rId2"/>
           <a:srcRect r="1445"/>
           <a:stretch>
             <a:fillRect/>
@@ -5251,7 +5260,14 @@
         <p:cNvGrpSpPr/>
         <p:nvPr/>
       </p:nvGrpSpPr>
-      <p:grpSpPr/>
+      <p:grpSpPr>
+        <a:xfrm>
+          <a:off x="0" y="0"/>
+          <a:ext cx="0" cy="0"/>
+          <a:chOff x="0" y="0"/>
+          <a:chExt cx="0" cy="0"/>
+        </a:xfrm>
+      </p:grpSpPr>
       <p:sp>
         <p:nvSpPr>
           <p:cNvPr id="2" name="Title 1"/>
@@ -5272,6 +5288,7 @@
           <a:bodyPr>
             <a:normAutofit fontScale="90000"/>
           </a:bodyPr>
+          <a:lstStyle/>
           <a:p>
             <a:r>
               <a:rPr lang="en-US" b="1" dirty="0" smtClean="0">
@@ -5313,9 +5330,12 @@
         <p:spPr/>
         <p:txBody>
           <a:bodyPr/>
+          <a:lstStyle/>
           <a:p>
             <a:fld id="{29FF40B1-8B0E-4B72-970D-715561CA4C5D}" type="datetime1">
               <a:rPr lang="en-US" smtClean="0"/>
+              <a:pPr/>
+              <a:t>2/21/2021</a:t>
             </a:fld>
             <a:endParaRPr lang="en-US"/>
           </a:p>
@@ -5334,6 +5354,7 @@
         <p:spPr/>
         <p:txBody>
           <a:bodyPr/>
+          <a:lstStyle/>
           <a:p>
             <a:r>
               <a:rPr lang="en-US" smtClean="0"/>
@@ -5356,9 +5377,12 @@
         <p:spPr/>
         <p:txBody>
           <a:bodyPr/>
+          <a:lstStyle/>
           <a:p>
             <a:fld id="{B6F15528-21DE-4FAA-801E-634DDDAF4B2B}" type="slidenum">
               <a:rPr lang="en-US" smtClean="0"/>
+              <a:pPr/>
+              <a:t>9</a:t>
             </a:fld>
             <a:endParaRPr lang="en-US"/>
           </a:p>
@@ -5368,14 +5392,14 @@
         <p:nvPicPr>
           <p:cNvPr id="7" name="Picture 2" descr="GCIT"/>
           <p:cNvPicPr>
-            <a:picLocks noChangeAspect="1" noChangeArrowheads="1"/>
+            <a:picLocks noGrp="1" noChangeAspect="1" noChangeArrowheads="1"/>
           </p:cNvPicPr>
           <p:nvPr>
             <p:ph sz="half" idx="2"/>
           </p:nvPr>
         </p:nvPicPr>
         <p:blipFill>
-          <a:blip r:embed="rId1"/>
+          <a:blip r:embed="rId2"/>
           <a:srcRect r="1445"/>
           <a:stretch>
             <a:fillRect/>
@@ -5678,9 +5702,11 @@
       </a:bgFillStyleLst>
     </a:fmtScheme>
   </a:themeElements>
+  <a:objectDefaults/>
+  <a:extraClrSchemeLst/>
   <a:extLst>
     <a:ext uri="{05A4C25C-085E-4340-85A3-A5531E510DB2}">
-      <thm15:themeFamily xmlns:thm15="http://schemas.microsoft.com/office/thememl/2012/main" name="Office Theme" id="{62F939B6-93AF-4DB8-9C6B-D6C7DFDC589F}" vid="{4A3C46E8-61CC-4603-A589-7422A47A8E4A}"/>
+      <thm15:themeFamily xmlns:thm15="http://schemas.microsoft.com/office/thememl/2012/main" xmlns="" name="Office Theme" id="{62F939B6-93AF-4DB8-9C6B-D6C7DFDC589F}" vid="{4A3C46E8-61CC-4603-A589-7422A47A8E4A}"/>
     </a:ext>
   </a:extLst>
 </a:theme>
@@ -5964,9 +5990,11 @@
       </a:bgFillStyleLst>
     </a:fmtScheme>
   </a:themeElements>
+  <a:objectDefaults/>
+  <a:extraClrSchemeLst/>
   <a:extLst>
     <a:ext uri="{05A4C25C-085E-4340-85A3-A5531E510DB2}">
-      <thm15:themeFamily xmlns:thm15="http://schemas.microsoft.com/office/thememl/2012/main" name="Office Theme" id="{62F939B6-93AF-4DB8-9C6B-D6C7DFDC589F}" vid="{4A3C46E8-61CC-4603-A589-7422A47A8E4A}"/>
+      <thm15:themeFamily xmlns:thm15="http://schemas.microsoft.com/office/thememl/2012/main" xmlns="" name="Office Theme" id="{62F939B6-93AF-4DB8-9C6B-D6C7DFDC589F}" vid="{4A3C46E8-61CC-4603-A589-7422A47A8E4A}"/>
     </a:ext>
   </a:extLst>
 </a:theme>

</xml_diff>